<commit_message>
1. Update schedule July
</commit_message>
<xml_diff>
--- a/assets/img/people/New Microsoft PowerPoint Presentation.pptx
+++ b/assets/img/people/New Microsoft PowerPoint Presentation.pptx
@@ -259,7 +259,7 @@
           <a:p>
             <a:fld id="{BE68067C-B7E2-40A3-A5E4-B47E01AE3DF3}" type="datetimeFigureOut">
               <a:rPr lang="en-US" smtClean="0"/>
-              <a:t>12/31/2024</a:t>
+              <a:t>7/30/2025</a:t>
             </a:fld>
             <a:endParaRPr lang="en-US"/>
           </a:p>
@@ -457,7 +457,7 @@
           <a:p>
             <a:fld id="{BE68067C-B7E2-40A3-A5E4-B47E01AE3DF3}" type="datetimeFigureOut">
               <a:rPr lang="en-US" smtClean="0"/>
-              <a:t>12/31/2024</a:t>
+              <a:t>7/30/2025</a:t>
             </a:fld>
             <a:endParaRPr lang="en-US"/>
           </a:p>
@@ -665,7 +665,7 @@
           <a:p>
             <a:fld id="{BE68067C-B7E2-40A3-A5E4-B47E01AE3DF3}" type="datetimeFigureOut">
               <a:rPr lang="en-US" smtClean="0"/>
-              <a:t>12/31/2024</a:t>
+              <a:t>7/30/2025</a:t>
             </a:fld>
             <a:endParaRPr lang="en-US"/>
           </a:p>
@@ -863,7 +863,7 @@
           <a:p>
             <a:fld id="{BE68067C-B7E2-40A3-A5E4-B47E01AE3DF3}" type="datetimeFigureOut">
               <a:rPr lang="en-US" smtClean="0"/>
-              <a:t>12/31/2024</a:t>
+              <a:t>7/30/2025</a:t>
             </a:fld>
             <a:endParaRPr lang="en-US"/>
           </a:p>
@@ -1138,7 +1138,7 @@
           <a:p>
             <a:fld id="{BE68067C-B7E2-40A3-A5E4-B47E01AE3DF3}" type="datetimeFigureOut">
               <a:rPr lang="en-US" smtClean="0"/>
-              <a:t>12/31/2024</a:t>
+              <a:t>7/30/2025</a:t>
             </a:fld>
             <a:endParaRPr lang="en-US"/>
           </a:p>
@@ -1403,7 +1403,7 @@
           <a:p>
             <a:fld id="{BE68067C-B7E2-40A3-A5E4-B47E01AE3DF3}" type="datetimeFigureOut">
               <a:rPr lang="en-US" smtClean="0"/>
-              <a:t>12/31/2024</a:t>
+              <a:t>7/30/2025</a:t>
             </a:fld>
             <a:endParaRPr lang="en-US"/>
           </a:p>
@@ -1815,7 +1815,7 @@
           <a:p>
             <a:fld id="{BE68067C-B7E2-40A3-A5E4-B47E01AE3DF3}" type="datetimeFigureOut">
               <a:rPr lang="en-US" smtClean="0"/>
-              <a:t>12/31/2024</a:t>
+              <a:t>7/30/2025</a:t>
             </a:fld>
             <a:endParaRPr lang="en-US"/>
           </a:p>
@@ -1956,7 +1956,7 @@
           <a:p>
             <a:fld id="{BE68067C-B7E2-40A3-A5E4-B47E01AE3DF3}" type="datetimeFigureOut">
               <a:rPr lang="en-US" smtClean="0"/>
-              <a:t>12/31/2024</a:t>
+              <a:t>7/30/2025</a:t>
             </a:fld>
             <a:endParaRPr lang="en-US"/>
           </a:p>
@@ -2069,7 +2069,7 @@
           <a:p>
             <a:fld id="{BE68067C-B7E2-40A3-A5E4-B47E01AE3DF3}" type="datetimeFigureOut">
               <a:rPr lang="en-US" smtClean="0"/>
-              <a:t>12/31/2024</a:t>
+              <a:t>7/30/2025</a:t>
             </a:fld>
             <a:endParaRPr lang="en-US"/>
           </a:p>
@@ -2380,7 +2380,7 @@
           <a:p>
             <a:fld id="{BE68067C-B7E2-40A3-A5E4-B47E01AE3DF3}" type="datetimeFigureOut">
               <a:rPr lang="en-US" smtClean="0"/>
-              <a:t>12/31/2024</a:t>
+              <a:t>7/30/2025</a:t>
             </a:fld>
             <a:endParaRPr lang="en-US"/>
           </a:p>
@@ -2668,7 +2668,7 @@
           <a:p>
             <a:fld id="{BE68067C-B7E2-40A3-A5E4-B47E01AE3DF3}" type="datetimeFigureOut">
               <a:rPr lang="en-US" smtClean="0"/>
-              <a:t>12/31/2024</a:t>
+              <a:t>7/30/2025</a:t>
             </a:fld>
             <a:endParaRPr lang="en-US"/>
           </a:p>
@@ -2909,7 +2909,7 @@
           <a:p>
             <a:fld id="{BE68067C-B7E2-40A3-A5E4-B47E01AE3DF3}" type="datetimeFigureOut">
               <a:rPr lang="en-US" smtClean="0"/>
-              <a:t>12/31/2024</a:t>
+              <a:t>7/30/2025</a:t>
             </a:fld>
             <a:endParaRPr lang="en-US"/>
           </a:p>
@@ -3328,10 +3328,10 @@
       </p:grpSpPr>
       <p:pic>
         <p:nvPicPr>
-          <p:cNvPr id="11" name="Picture 10" descr="A person smiling for a picture&#10;&#10;Description automatically generated">
-            <a:extLst>
-              <a:ext uri="{FF2B5EF4-FFF2-40B4-BE49-F238E27FC236}">
-                <a16:creationId xmlns:a16="http://schemas.microsoft.com/office/drawing/2014/main" id="{EF8566C2-1224-EFF6-9C7C-1A640C68307F}"/>
+          <p:cNvPr id="5" name="Picture 4">
+            <a:extLst>
+              <a:ext uri="{FF2B5EF4-FFF2-40B4-BE49-F238E27FC236}">
+                <a16:creationId xmlns:a16="http://schemas.microsoft.com/office/drawing/2014/main" id="{1E9C1A5E-1A73-5467-AE3C-07E3B383AF79}"/>
               </a:ext>
             </a:extLst>
           </p:cNvPr>
@@ -3348,13 +3348,13 @@
               </a:ext>
             </a:extLst>
           </a:blip>
-          <a:srcRect l="5802" t="3200" r="14398" b="16700"/>
+          <a:srcRect l="24293" t="15307" r="14254" b="32888"/>
           <a:stretch/>
         </p:blipFill>
         <p:spPr>
           <a:xfrm>
-            <a:off x="45009" y="44349"/>
-            <a:ext cx="3270401" cy="3282696"/>
+            <a:off x="41858" y="44349"/>
+            <a:ext cx="3273552" cy="3273550"/>
           </a:xfrm>
           <a:prstGeom prst="ellipse">
             <a:avLst/>

</xml_diff>